<commit_message>
Figure and supplemental edits after PeerJ request
</commit_message>
<xml_diff>
--- a/output/ThreePlotPCA_shapes.pptx
+++ b/output/ThreePlotPCA_shapes.pptx
@@ -288,7 +288,7 @@
           <a:p>
             <a:fld id="{9FE61444-4E6E-4CEE-8736-B00447B90B41}" type="datetimeFigureOut">
               <a:rPr lang="en-IE" smtClean="0"/>
-              <a:t>27/01/2015</a:t>
+              <a:t>28/03/2015</a:t>
             </a:fld>
             <a:endParaRPr lang="en-IE"/>
           </a:p>
@@ -458,7 +458,7 @@
           <a:p>
             <a:fld id="{9FE61444-4E6E-4CEE-8736-B00447B90B41}" type="datetimeFigureOut">
               <a:rPr lang="en-IE" smtClean="0"/>
-              <a:t>27/01/2015</a:t>
+              <a:t>28/03/2015</a:t>
             </a:fld>
             <a:endParaRPr lang="en-IE"/>
           </a:p>
@@ -638,7 +638,7 @@
           <a:p>
             <a:fld id="{9FE61444-4E6E-4CEE-8736-B00447B90B41}" type="datetimeFigureOut">
               <a:rPr lang="en-IE" smtClean="0"/>
-              <a:t>27/01/2015</a:t>
+              <a:t>28/03/2015</a:t>
             </a:fld>
             <a:endParaRPr lang="en-IE"/>
           </a:p>
@@ -808,7 +808,7 @@
           <a:p>
             <a:fld id="{9FE61444-4E6E-4CEE-8736-B00447B90B41}" type="datetimeFigureOut">
               <a:rPr lang="en-IE" smtClean="0"/>
-              <a:t>27/01/2015</a:t>
+              <a:t>28/03/2015</a:t>
             </a:fld>
             <a:endParaRPr lang="en-IE"/>
           </a:p>
@@ -1054,7 +1054,7 @@
           <a:p>
             <a:fld id="{9FE61444-4E6E-4CEE-8736-B00447B90B41}" type="datetimeFigureOut">
               <a:rPr lang="en-IE" smtClean="0"/>
-              <a:t>27/01/2015</a:t>
+              <a:t>28/03/2015</a:t>
             </a:fld>
             <a:endParaRPr lang="en-IE"/>
           </a:p>
@@ -1342,7 +1342,7 @@
           <a:p>
             <a:fld id="{9FE61444-4E6E-4CEE-8736-B00447B90B41}" type="datetimeFigureOut">
               <a:rPr lang="en-IE" smtClean="0"/>
-              <a:t>27/01/2015</a:t>
+              <a:t>28/03/2015</a:t>
             </a:fld>
             <a:endParaRPr lang="en-IE"/>
           </a:p>
@@ -1764,7 +1764,7 @@
           <a:p>
             <a:fld id="{9FE61444-4E6E-4CEE-8736-B00447B90B41}" type="datetimeFigureOut">
               <a:rPr lang="en-IE" smtClean="0"/>
-              <a:t>27/01/2015</a:t>
+              <a:t>28/03/2015</a:t>
             </a:fld>
             <a:endParaRPr lang="en-IE"/>
           </a:p>
@@ -1882,7 +1882,7 @@
           <a:p>
             <a:fld id="{9FE61444-4E6E-4CEE-8736-B00447B90B41}" type="datetimeFigureOut">
               <a:rPr lang="en-IE" smtClean="0"/>
-              <a:t>27/01/2015</a:t>
+              <a:t>28/03/2015</a:t>
             </a:fld>
             <a:endParaRPr lang="en-IE"/>
           </a:p>
@@ -1977,7 +1977,7 @@
           <a:p>
             <a:fld id="{9FE61444-4E6E-4CEE-8736-B00447B90B41}" type="datetimeFigureOut">
               <a:rPr lang="en-IE" smtClean="0"/>
-              <a:t>27/01/2015</a:t>
+              <a:t>28/03/2015</a:t>
             </a:fld>
             <a:endParaRPr lang="en-IE"/>
           </a:p>
@@ -2254,7 +2254,7 @@
           <a:p>
             <a:fld id="{9FE61444-4E6E-4CEE-8736-B00447B90B41}" type="datetimeFigureOut">
               <a:rPr lang="en-IE" smtClean="0"/>
-              <a:t>27/01/2015</a:t>
+              <a:t>28/03/2015</a:t>
             </a:fld>
             <a:endParaRPr lang="en-IE"/>
           </a:p>
@@ -2507,7 +2507,7 @@
           <a:p>
             <a:fld id="{9FE61444-4E6E-4CEE-8736-B00447B90B41}" type="datetimeFigureOut">
               <a:rPr lang="en-IE" smtClean="0"/>
-              <a:t>27/01/2015</a:t>
+              <a:t>28/03/2015</a:t>
             </a:fld>
             <a:endParaRPr lang="en-IE"/>
           </a:p>
@@ -2720,7 +2720,7 @@
           <a:p>
             <a:fld id="{9FE61444-4E6E-4CEE-8736-B00447B90B41}" type="datetimeFigureOut">
               <a:rPr lang="en-IE" smtClean="0"/>
-              <a:t>27/01/2015</a:t>
+              <a:t>28/03/2015</a:t>
             </a:fld>
             <a:endParaRPr lang="en-IE"/>
           </a:p>
@@ -3081,6 +3081,16 @@
 <file path=ppt/slides/slide1.xml><?xml version="1.0" encoding="utf-8"?>
 <p:sld xmlns:a="http://schemas.openxmlformats.org/drawingml/2006/main" xmlns:r="http://schemas.openxmlformats.org/officeDocument/2006/relationships" xmlns:p="http://schemas.openxmlformats.org/presentationml/2006/main">
   <p:cSld>
+    <p:bg>
+      <p:bgPr>
+        <a:solidFill>
+          <a:schemeClr val="bg1">
+            <a:lumMod val="75000"/>
+          </a:schemeClr>
+        </a:solidFill>
+        <a:effectLst/>
+      </p:bgPr>
+    </p:bg>
     <p:spTree>
       <p:nvGrpSpPr>
         <p:cNvPr id="1" name=""/>
@@ -3139,7 +3149,7 @@
           <a:lstStyle/>
           <a:p>
             <a:pPr algn="ctr"/>
-            <a:endParaRPr lang="en-IE"/>
+            <a:endParaRPr lang="en-IE" dirty="0"/>
           </a:p>
         </p:txBody>
       </p:sp>
@@ -3557,6 +3567,96 @@
               <a:t>Golden Moles</a:t>
             </a:r>
             <a:endParaRPr lang="en-IE" sz="2000" dirty="0"/>
+          </a:p>
+        </p:txBody>
+      </p:sp>
+      <p:sp>
+        <p:nvSpPr>
+          <p:cNvPr id="2" name="TextBox 1"/>
+          <p:cNvSpPr txBox="1"/>
+          <p:nvPr/>
+        </p:nvSpPr>
+        <p:spPr>
+          <a:xfrm>
+            <a:off x="719480" y="308072"/>
+            <a:ext cx="324128" cy="369332"/>
+          </a:xfrm>
+          <a:prstGeom prst="rect">
+            <a:avLst/>
+          </a:prstGeom>
+          <a:noFill/>
+        </p:spPr>
+        <p:txBody>
+          <a:bodyPr wrap="none" rtlCol="0">
+            <a:spAutoFit/>
+          </a:bodyPr>
+          <a:lstStyle/>
+          <a:p>
+            <a:r>
+              <a:rPr lang="en-IE" b="1" dirty="0" smtClean="0"/>
+              <a:t>A</a:t>
+            </a:r>
+            <a:endParaRPr lang="en-IE" b="1" dirty="0"/>
+          </a:p>
+        </p:txBody>
+      </p:sp>
+      <p:sp>
+        <p:nvSpPr>
+          <p:cNvPr id="19" name="TextBox 18"/>
+          <p:cNvSpPr txBox="1"/>
+          <p:nvPr/>
+        </p:nvSpPr>
+        <p:spPr>
+          <a:xfrm>
+            <a:off x="4535904" y="332656"/>
+            <a:ext cx="324128" cy="369332"/>
+          </a:xfrm>
+          <a:prstGeom prst="rect">
+            <a:avLst/>
+          </a:prstGeom>
+          <a:noFill/>
+        </p:spPr>
+        <p:txBody>
+          <a:bodyPr wrap="none" rtlCol="0">
+            <a:spAutoFit/>
+          </a:bodyPr>
+          <a:lstStyle/>
+          <a:p>
+            <a:r>
+              <a:rPr lang="en-IE" b="1" dirty="0" smtClean="0"/>
+              <a:t>B</a:t>
+            </a:r>
+            <a:endParaRPr lang="en-IE" b="1" dirty="0"/>
+          </a:p>
+        </p:txBody>
+      </p:sp>
+      <p:sp>
+        <p:nvSpPr>
+          <p:cNvPr id="20" name="TextBox 19"/>
+          <p:cNvSpPr txBox="1"/>
+          <p:nvPr/>
+        </p:nvSpPr>
+        <p:spPr>
+          <a:xfrm>
+            <a:off x="935504" y="3347700"/>
+            <a:ext cx="306494" cy="369332"/>
+          </a:xfrm>
+          <a:prstGeom prst="rect">
+            <a:avLst/>
+          </a:prstGeom>
+          <a:noFill/>
+        </p:spPr>
+        <p:txBody>
+          <a:bodyPr wrap="none" rtlCol="0">
+            <a:spAutoFit/>
+          </a:bodyPr>
+          <a:lstStyle/>
+          <a:p>
+            <a:r>
+              <a:rPr lang="en-IE" b="1" dirty="0" smtClean="0"/>
+              <a:t>C</a:t>
+            </a:r>
+            <a:endParaRPr lang="en-IE" b="1" dirty="0"/>
           </a:p>
         </p:txBody>
       </p:sp>

</xml_diff>